<commit_message>
feito em casa a noite 18/04
</commit_message>
<xml_diff>
--- a/app-senhas.pptx
+++ b/app-senhas.pptx
@@ -202,7 +202,7 @@
           <a:p>
             <a:fld id="{FEFE60F1-8881-4021-B46B-0FC20184E387}" type="datetimeFigureOut">
               <a:rPr lang="pt-BR" smtClean="0"/>
-              <a:t>23/02/2024</a:t>
+              <a:t>18/04/2024</a:t>
             </a:fld>
             <a:endParaRPr lang="pt-BR"/>
           </a:p>
@@ -1153,7 +1153,7 @@
           <a:p>
             <a:fld id="{CC520FC9-FA72-40E8-B1A8-DE5A7DC4AEE0}" type="datetimeFigureOut">
               <a:rPr lang="pt-BR" smtClean="0"/>
-              <a:t>23/02/2024</a:t>
+              <a:t>18/04/2024</a:t>
             </a:fld>
             <a:endParaRPr lang="pt-BR"/>
           </a:p>
@@ -1351,7 +1351,7 @@
           <a:p>
             <a:fld id="{CC520FC9-FA72-40E8-B1A8-DE5A7DC4AEE0}" type="datetimeFigureOut">
               <a:rPr lang="pt-BR" smtClean="0"/>
-              <a:t>23/02/2024</a:t>
+              <a:t>18/04/2024</a:t>
             </a:fld>
             <a:endParaRPr lang="pt-BR"/>
           </a:p>
@@ -1559,7 +1559,7 @@
           <a:p>
             <a:fld id="{CC520FC9-FA72-40E8-B1A8-DE5A7DC4AEE0}" type="datetimeFigureOut">
               <a:rPr lang="pt-BR" smtClean="0"/>
-              <a:t>23/02/2024</a:t>
+              <a:t>18/04/2024</a:t>
             </a:fld>
             <a:endParaRPr lang="pt-BR"/>
           </a:p>
@@ -1757,7 +1757,7 @@
           <a:p>
             <a:fld id="{CC520FC9-FA72-40E8-B1A8-DE5A7DC4AEE0}" type="datetimeFigureOut">
               <a:rPr lang="pt-BR" smtClean="0"/>
-              <a:t>23/02/2024</a:t>
+              <a:t>18/04/2024</a:t>
             </a:fld>
             <a:endParaRPr lang="pt-BR"/>
           </a:p>
@@ -2032,7 +2032,7 @@
           <a:p>
             <a:fld id="{CC520FC9-FA72-40E8-B1A8-DE5A7DC4AEE0}" type="datetimeFigureOut">
               <a:rPr lang="pt-BR" smtClean="0"/>
-              <a:t>23/02/2024</a:t>
+              <a:t>18/04/2024</a:t>
             </a:fld>
             <a:endParaRPr lang="pt-BR"/>
           </a:p>
@@ -2297,7 +2297,7 @@
           <a:p>
             <a:fld id="{CC520FC9-FA72-40E8-B1A8-DE5A7DC4AEE0}" type="datetimeFigureOut">
               <a:rPr lang="pt-BR" smtClean="0"/>
-              <a:t>23/02/2024</a:t>
+              <a:t>18/04/2024</a:t>
             </a:fld>
             <a:endParaRPr lang="pt-BR"/>
           </a:p>
@@ -2709,7 +2709,7 @@
           <a:p>
             <a:fld id="{CC520FC9-FA72-40E8-B1A8-DE5A7DC4AEE0}" type="datetimeFigureOut">
               <a:rPr lang="pt-BR" smtClean="0"/>
-              <a:t>23/02/2024</a:t>
+              <a:t>18/04/2024</a:t>
             </a:fld>
             <a:endParaRPr lang="pt-BR"/>
           </a:p>
@@ -2850,7 +2850,7 @@
           <a:p>
             <a:fld id="{CC520FC9-FA72-40E8-B1A8-DE5A7DC4AEE0}" type="datetimeFigureOut">
               <a:rPr lang="pt-BR" smtClean="0"/>
-              <a:t>23/02/2024</a:t>
+              <a:t>18/04/2024</a:t>
             </a:fld>
             <a:endParaRPr lang="pt-BR"/>
           </a:p>
@@ -2963,7 +2963,7 @@
           <a:p>
             <a:fld id="{CC520FC9-FA72-40E8-B1A8-DE5A7DC4AEE0}" type="datetimeFigureOut">
               <a:rPr lang="pt-BR" smtClean="0"/>
-              <a:t>23/02/2024</a:t>
+              <a:t>18/04/2024</a:t>
             </a:fld>
             <a:endParaRPr lang="pt-BR"/>
           </a:p>
@@ -3274,7 +3274,7 @@
           <a:p>
             <a:fld id="{CC520FC9-FA72-40E8-B1A8-DE5A7DC4AEE0}" type="datetimeFigureOut">
               <a:rPr lang="pt-BR" smtClean="0"/>
-              <a:t>23/02/2024</a:t>
+              <a:t>18/04/2024</a:t>
             </a:fld>
             <a:endParaRPr lang="pt-BR"/>
           </a:p>
@@ -3562,7 +3562,7 @@
           <a:p>
             <a:fld id="{CC520FC9-FA72-40E8-B1A8-DE5A7DC4AEE0}" type="datetimeFigureOut">
               <a:rPr lang="pt-BR" smtClean="0"/>
-              <a:t>23/02/2024</a:t>
+              <a:t>18/04/2024</a:t>
             </a:fld>
             <a:endParaRPr lang="pt-BR"/>
           </a:p>
@@ -3803,7 +3803,7 @@
           <a:p>
             <a:fld id="{CC520FC9-FA72-40E8-B1A8-DE5A7DC4AEE0}" type="datetimeFigureOut">
               <a:rPr lang="pt-BR" smtClean="0"/>
-              <a:t>23/02/2024</a:t>
+              <a:t>18/04/2024</a:t>
             </a:fld>
             <a:endParaRPr lang="pt-BR"/>
           </a:p>
@@ -5504,6 +5504,66 @@
           </a:p>
         </p:txBody>
       </p:sp>
+      <p:pic>
+        <p:nvPicPr>
+          <p:cNvPr id="3" name="Imagem 2">
+            <a:extLst>
+              <a:ext uri="{FF2B5EF4-FFF2-40B4-BE49-F238E27FC236}">
+                <a16:creationId xmlns:a16="http://schemas.microsoft.com/office/drawing/2014/main" id="{BF52F54D-DA2C-140A-157C-B3DD1D06F751}"/>
+              </a:ext>
+            </a:extLst>
+          </p:cNvPr>
+          <p:cNvPicPr>
+            <a:picLocks noChangeAspect="1"/>
+          </p:cNvPicPr>
+          <p:nvPr/>
+        </p:nvPicPr>
+        <p:blipFill>
+          <a:blip r:embed="rId4"/>
+          <a:stretch>
+            <a:fillRect/>
+          </a:stretch>
+        </p:blipFill>
+        <p:spPr>
+          <a:xfrm>
+            <a:off x="1743285" y="2034291"/>
+            <a:ext cx="1695687" cy="2572109"/>
+          </a:xfrm>
+          <a:prstGeom prst="rect">
+            <a:avLst/>
+          </a:prstGeom>
+        </p:spPr>
+      </p:pic>
+      <p:pic>
+        <p:nvPicPr>
+          <p:cNvPr id="6" name="Imagem 5">
+            <a:extLst>
+              <a:ext uri="{FF2B5EF4-FFF2-40B4-BE49-F238E27FC236}">
+                <a16:creationId xmlns:a16="http://schemas.microsoft.com/office/drawing/2014/main" id="{503574B3-AF3D-9C9E-9F85-B8F41A3A56DB}"/>
+              </a:ext>
+            </a:extLst>
+          </p:cNvPr>
+          <p:cNvPicPr>
+            <a:picLocks noChangeAspect="1"/>
+          </p:cNvPicPr>
+          <p:nvPr/>
+        </p:nvPicPr>
+        <p:blipFill>
+          <a:blip r:embed="rId5"/>
+          <a:stretch>
+            <a:fillRect/>
+          </a:stretch>
+        </p:blipFill>
+        <p:spPr>
+          <a:xfrm>
+            <a:off x="7967050" y="1940551"/>
+            <a:ext cx="3205775" cy="4696237"/>
+          </a:xfrm>
+          <a:prstGeom prst="rect">
+            <a:avLst/>
+          </a:prstGeom>
+        </p:spPr>
+      </p:pic>
     </p:spTree>
     <p:extLst>
       <p:ext uri="{BB962C8B-B14F-4D97-AF65-F5344CB8AC3E}">

</xml_diff>